<commit_message>
Implementate 4 slide per la presentazione Power Point riguardanti il prototipo App e le sue funzionalità
</commit_message>
<xml_diff>
--- a/Esposizione/Presentazione PPT.pptx
+++ b/Esposizione/Presentazione PPT.pptx
@@ -10,7 +10,11 @@
     <p:sldId id="258" r:id="rId4"/>
     <p:sldId id="259" r:id="rId5"/>
     <p:sldId id="260" r:id="rId6"/>
-    <p:sldId id="261" r:id="rId7"/>
+    <p:sldId id="262" r:id="rId7"/>
+    <p:sldId id="263" r:id="rId8"/>
+    <p:sldId id="264" r:id="rId9"/>
+    <p:sldId id="265" r:id="rId10"/>
+    <p:sldId id="261" r:id="rId11"/>
   </p:sldIdLst>
   <p:sldSz cx="12192000" cy="6858000"/>
   <p:notesSz cx="6858000" cy="9144000"/>
@@ -300,7 +304,7 @@
           <a:p>
             <a:fld id="{4AAD347D-5ACD-4C99-B74B-A9C85AD731AF}" type="datetimeFigureOut">
               <a:rPr lang="en-US" dirty="0"/>
-              <a:t>5/28/2021</a:t>
+              <a:t>6/3/2021</a:t>
             </a:fld>
             <a:endParaRPr lang="en-US" dirty="0"/>
           </a:p>
@@ -570,7 +574,7 @@
           <a:p>
             <a:fld id="{4509A250-FF31-4206-8172-F9D3106AACB1}" type="datetimeFigureOut">
               <a:rPr lang="en-US" dirty="0"/>
-              <a:t>5/28/2021</a:t>
+              <a:t>6/3/2021</a:t>
             </a:fld>
             <a:endParaRPr lang="en-US" dirty="0"/>
           </a:p>
@@ -759,7 +763,7 @@
           <a:p>
             <a:fld id="{4509A250-FF31-4206-8172-F9D3106AACB1}" type="datetimeFigureOut">
               <a:rPr lang="en-US" dirty="0"/>
-              <a:t>5/28/2021</a:t>
+              <a:t>6/3/2021</a:t>
             </a:fld>
             <a:endParaRPr lang="en-US" dirty="0"/>
           </a:p>
@@ -1022,7 +1026,7 @@
           <a:p>
             <a:fld id="{4509A250-FF31-4206-8172-F9D3106AACB1}" type="datetimeFigureOut">
               <a:rPr lang="en-US" dirty="0"/>
-              <a:t>5/28/2021</a:t>
+              <a:t>6/3/2021</a:t>
             </a:fld>
             <a:endParaRPr lang="en-US" dirty="0"/>
           </a:p>
@@ -1349,7 +1353,7 @@
           <a:p>
             <a:fld id="{4509A250-FF31-4206-8172-F9D3106AACB1}" type="datetimeFigureOut">
               <a:rPr lang="en-US" dirty="0"/>
-              <a:t>5/28/2021</a:t>
+              <a:t>6/3/2021</a:t>
             </a:fld>
             <a:endParaRPr lang="en-US" dirty="0"/>
           </a:p>
@@ -1954,7 +1958,7 @@
           <a:p>
             <a:fld id="{4509A250-FF31-4206-8172-F9D3106AACB1}" type="datetimeFigureOut">
               <a:rPr lang="en-US" dirty="0"/>
-              <a:t>5/28/2021</a:t>
+              <a:t>6/3/2021</a:t>
             </a:fld>
             <a:endParaRPr lang="en-US" dirty="0"/>
           </a:p>
@@ -2796,7 +2800,7 @@
           <a:p>
             <a:fld id="{4509A250-FF31-4206-8172-F9D3106AACB1}" type="datetimeFigureOut">
               <a:rPr lang="en-US" dirty="0"/>
-              <a:t>5/28/2021</a:t>
+              <a:t>6/3/2021</a:t>
             </a:fld>
             <a:endParaRPr lang="en-US" dirty="0"/>
           </a:p>
@@ -2961,7 +2965,7 @@
           <a:p>
             <a:fld id="{4509A250-FF31-4206-8172-F9D3106AACB1}" type="datetimeFigureOut">
               <a:rPr lang="en-US" dirty="0"/>
-              <a:t>5/28/2021</a:t>
+              <a:t>6/3/2021</a:t>
             </a:fld>
             <a:endParaRPr lang="en-US" dirty="0"/>
           </a:p>
@@ -3136,7 +3140,7 @@
           <a:p>
             <a:fld id="{4509A250-FF31-4206-8172-F9D3106AACB1}" type="datetimeFigureOut">
               <a:rPr lang="en-US" dirty="0"/>
-              <a:t>5/28/2021</a:t>
+              <a:t>6/3/2021</a:t>
             </a:fld>
             <a:endParaRPr lang="en-US" dirty="0"/>
           </a:p>
@@ -3301,7 +3305,7 @@
           <a:p>
             <a:fld id="{4509A250-FF31-4206-8172-F9D3106AACB1}" type="datetimeFigureOut">
               <a:rPr lang="en-US" dirty="0"/>
-              <a:t>5/28/2021</a:t>
+              <a:t>6/3/2021</a:t>
             </a:fld>
             <a:endParaRPr lang="en-US" dirty="0"/>
           </a:p>
@@ -3540,7 +3544,7 @@
           <a:p>
             <a:fld id="{4509A250-FF31-4206-8172-F9D3106AACB1}" type="datetimeFigureOut">
               <a:rPr lang="en-US" dirty="0"/>
-              <a:t>5/28/2021</a:t>
+              <a:t>6/3/2021</a:t>
             </a:fld>
             <a:endParaRPr lang="en-US" dirty="0"/>
           </a:p>
@@ -3827,7 +3831,7 @@
           <a:p>
             <a:fld id="{4509A250-FF31-4206-8172-F9D3106AACB1}" type="datetimeFigureOut">
               <a:rPr lang="en-US" dirty="0"/>
-              <a:t>5/28/2021</a:t>
+              <a:t>6/3/2021</a:t>
             </a:fld>
             <a:endParaRPr lang="en-US" dirty="0"/>
           </a:p>
@@ -4260,7 +4264,7 @@
           <a:p>
             <a:fld id="{4509A250-FF31-4206-8172-F9D3106AACB1}" type="datetimeFigureOut">
               <a:rPr lang="en-US" dirty="0"/>
-              <a:t>5/28/2021</a:t>
+              <a:t>6/3/2021</a:t>
             </a:fld>
             <a:endParaRPr lang="en-US" dirty="0"/>
           </a:p>
@@ -4373,7 +4377,7 @@
           <a:p>
             <a:fld id="{4509A250-FF31-4206-8172-F9D3106AACB1}" type="datetimeFigureOut">
               <a:rPr lang="en-US" dirty="0"/>
-              <a:t>5/28/2021</a:t>
+              <a:t>6/3/2021</a:t>
             </a:fld>
             <a:endParaRPr lang="en-US" dirty="0"/>
           </a:p>
@@ -4463,7 +4467,7 @@
           <a:p>
             <a:fld id="{4509A250-FF31-4206-8172-F9D3106AACB1}" type="datetimeFigureOut">
               <a:rPr lang="en-US" dirty="0"/>
-              <a:t>5/28/2021</a:t>
+              <a:t>6/3/2021</a:t>
             </a:fld>
             <a:endParaRPr lang="en-US" dirty="0"/>
           </a:p>
@@ -4737,7 +4741,7 @@
           <a:p>
             <a:fld id="{4509A250-FF31-4206-8172-F9D3106AACB1}" type="datetimeFigureOut">
               <a:rPr lang="en-US" dirty="0"/>
-              <a:t>5/28/2021</a:t>
+              <a:t>6/3/2021</a:t>
             </a:fld>
             <a:endParaRPr lang="en-US" dirty="0"/>
           </a:p>
@@ -5007,7 +5011,7 @@
           <a:p>
             <a:fld id="{4509A250-FF31-4206-8172-F9D3106AACB1}" type="datetimeFigureOut">
               <a:rPr lang="en-US" dirty="0"/>
-              <a:t>5/28/2021</a:t>
+              <a:t>6/3/2021</a:t>
             </a:fld>
             <a:endParaRPr lang="en-US" dirty="0"/>
           </a:p>
@@ -5431,7 +5435,7 @@
           <a:p>
             <a:fld id="{4509A250-FF31-4206-8172-F9D3106AACB1}" type="datetimeFigureOut">
               <a:rPr lang="en-US" dirty="0"/>
-              <a:t>5/28/2021</a:t>
+              <a:t>6/3/2021</a:t>
             </a:fld>
             <a:endParaRPr lang="en-US" dirty="0"/>
           </a:p>
@@ -5933,7 +5937,7 @@
           <p:cNvPr id="8" name="Immagine 7">
             <a:extLst>
               <a:ext uri="{FF2B5EF4-FFF2-40B4-BE49-F238E27FC236}">
-                <a16:creationId xmlns:a16="http://schemas.microsoft.com/office/drawing/2014/main" id="{AA262228-C09E-49ED-B62C-28F9D512CCFC}"/>
+                <a16:creationId xmlns:a16="http://schemas.microsoft.com/office/drawing/2014/main" xmlns="" id="{AA262228-C09E-49ED-B62C-28F9D512CCFC}"/>
               </a:ext>
             </a:extLst>
           </p:cNvPr>
@@ -5963,7 +5967,7 @@
           <p:cNvPr id="4" name="Immagine 3" descr="Immagine che contiene testo, scuro, cielo notturno&#10;&#10;Descrizione generata automaticamente">
             <a:extLst>
               <a:ext uri="{FF2B5EF4-FFF2-40B4-BE49-F238E27FC236}">
-                <a16:creationId xmlns:a16="http://schemas.microsoft.com/office/drawing/2014/main" id="{43821824-E35E-4B89-8209-46F6CE10FBB1}"/>
+                <a16:creationId xmlns:a16="http://schemas.microsoft.com/office/drawing/2014/main" xmlns="" id="{43821824-E35E-4B89-8209-46F6CE10FBB1}"/>
               </a:ext>
             </a:extLst>
           </p:cNvPr>
@@ -5998,13 +6002,152 @@
   <p:clrMapOvr>
     <a:masterClrMapping/>
   </p:clrMapOvr>
-  <mc:AlternateContent xmlns:mc="http://schemas.openxmlformats.org/markup-compatibility/2006">
-    <mc:Choice xmlns:p14="http://schemas.microsoft.com/office/powerpoint/2010/main" Requires="p14">
+  <mc:AlternateContent xmlns:mc="http://schemas.openxmlformats.org/markup-compatibility/2006" xmlns:p14="http://schemas.microsoft.com/office/powerpoint/2010/main">
+    <mc:Choice Requires="p14">
       <p:transition spd="slow" p14:dur="5000">
         <p:fade/>
       </p:transition>
     </mc:Choice>
-    <mc:Fallback>
+    <mc:Fallback xmlns="">
+      <p:transition spd="slow">
+        <p:fade/>
+      </p:transition>
+    </mc:Fallback>
+  </mc:AlternateContent>
+</p:sld>
+</file>
+
+<file path=ppt/slides/slide10.xml><?xml version="1.0" encoding="utf-8"?>
+<p:sld xmlns:a="http://schemas.openxmlformats.org/drawingml/2006/main" xmlns:r="http://schemas.openxmlformats.org/officeDocument/2006/relationships" xmlns:p="http://schemas.openxmlformats.org/presentationml/2006/main">
+  <p:cSld>
+    <p:spTree>
+      <p:nvGrpSpPr>
+        <p:cNvPr id="1" name=""/>
+        <p:cNvGrpSpPr/>
+        <p:nvPr/>
+      </p:nvGrpSpPr>
+      <p:grpSpPr>
+        <a:xfrm>
+          <a:off x="0" y="0"/>
+          <a:ext cx="0" cy="0"/>
+          <a:chOff x="0" y="0"/>
+          <a:chExt cx="0" cy="0"/>
+        </a:xfrm>
+      </p:grpSpPr>
+      <p:sp>
+        <p:nvSpPr>
+          <p:cNvPr id="2" name="Titolo 1">
+            <a:extLst>
+              <a:ext uri="{FF2B5EF4-FFF2-40B4-BE49-F238E27FC236}">
+                <a16:creationId xmlns:a16="http://schemas.microsoft.com/office/drawing/2014/main" xmlns="" id="{4DBA7C89-E1D5-4010-9ECC-75B75E24AA18}"/>
+              </a:ext>
+            </a:extLst>
+          </p:cNvPr>
+          <p:cNvSpPr>
+            <a:spLocks noGrp="1"/>
+          </p:cNvSpPr>
+          <p:nvPr>
+            <p:ph type="title"/>
+          </p:nvPr>
+        </p:nvSpPr>
+        <p:spPr/>
+        <p:txBody>
+          <a:bodyPr/>
+          <a:lstStyle/>
+          <a:p>
+            <a:endParaRPr lang="it-IT"/>
+          </a:p>
+        </p:txBody>
+      </p:sp>
+      <p:sp>
+        <p:nvSpPr>
+          <p:cNvPr id="3" name="Segnaposto contenuto 2">
+            <a:extLst>
+              <a:ext uri="{FF2B5EF4-FFF2-40B4-BE49-F238E27FC236}">
+                <a16:creationId xmlns:a16="http://schemas.microsoft.com/office/drawing/2014/main" xmlns="" id="{029A8546-28A6-4501-83D5-60C1026E1F99}"/>
+              </a:ext>
+            </a:extLst>
+          </p:cNvPr>
+          <p:cNvSpPr>
+            <a:spLocks noGrp="1"/>
+          </p:cNvSpPr>
+          <p:nvPr>
+            <p:ph idx="1"/>
+          </p:nvPr>
+        </p:nvSpPr>
+        <p:spPr/>
+        <p:txBody>
+          <a:bodyPr/>
+          <a:lstStyle/>
+          <a:p>
+            <a:endParaRPr lang="it-IT"/>
+          </a:p>
+        </p:txBody>
+      </p:sp>
+      <p:pic>
+        <p:nvPicPr>
+          <p:cNvPr id="2050" name="Picture 2" descr="E' il BlackOutTuesday: i profili Instagram si tingono di nero per  combattere il razzismo">
+            <a:extLst>
+              <a:ext uri="{FF2B5EF4-FFF2-40B4-BE49-F238E27FC236}">
+                <a16:creationId xmlns:a16="http://schemas.microsoft.com/office/drawing/2014/main" xmlns="" id="{DC5687C5-E9FA-4A35-A989-605D046F61C6}"/>
+              </a:ext>
+            </a:extLst>
+          </p:cNvPr>
+          <p:cNvPicPr>
+            <a:picLocks noChangeAspect="1" noChangeArrowheads="1"/>
+          </p:cNvPicPr>
+          <p:nvPr/>
+        </p:nvPicPr>
+        <p:blipFill>
+          <a:blip r:embed="rId2">
+            <a:extLst>
+              <a:ext uri="{28A0092B-C50C-407E-A947-70E740481C1C}">
+                <a14:useLocalDpi xmlns:a14="http://schemas.microsoft.com/office/drawing/2010/main" val="0"/>
+              </a:ext>
+            </a:extLst>
+          </a:blip>
+          <a:srcRect/>
+          <a:stretch>
+            <a:fillRect/>
+          </a:stretch>
+        </p:blipFill>
+        <p:spPr bwMode="auto">
+          <a:xfrm>
+            <a:off x="0" y="0"/>
+            <a:ext cx="12192000" cy="6858000"/>
+          </a:xfrm>
+          <a:prstGeom prst="rect">
+            <a:avLst/>
+          </a:prstGeom>
+          <a:noFill/>
+          <a:extLst>
+            <a:ext uri="{909E8E84-426E-40DD-AFC4-6F175D3DCCD1}">
+              <a14:hiddenFill xmlns:a14="http://schemas.microsoft.com/office/drawing/2010/main">
+                <a:solidFill>
+                  <a:srgbClr val="FFFFFF"/>
+                </a:solidFill>
+              </a14:hiddenFill>
+            </a:ext>
+          </a:extLst>
+        </p:spPr>
+      </p:pic>
+    </p:spTree>
+    <p:extLst>
+      <p:ext uri="{BB962C8B-B14F-4D97-AF65-F5344CB8AC3E}">
+        <p14:creationId xmlns:p14="http://schemas.microsoft.com/office/powerpoint/2010/main" val="3611896384"/>
+      </p:ext>
+    </p:extLst>
+  </p:cSld>
+  <p:clrMapOvr>
+    <a:masterClrMapping/>
+  </p:clrMapOvr>
+  <mc:AlternateContent xmlns:mc="http://schemas.openxmlformats.org/markup-compatibility/2006" xmlns:p14="http://schemas.microsoft.com/office/powerpoint/2010/main">
+    <mc:Choice Requires="p14">
+      <p:transition spd="slow" p14:dur="2750">
+        <p:fade/>
+      </p:transition>
+    </mc:Choice>
+    <mc:Fallback xmlns="">
       <p:transition spd="slow">
         <p:fade/>
       </p:transition>
@@ -6035,7 +6178,7 @@
           <p:cNvPr id="3" name="Segnaposto contenuto 2">
             <a:extLst>
               <a:ext uri="{FF2B5EF4-FFF2-40B4-BE49-F238E27FC236}">
-                <a16:creationId xmlns:a16="http://schemas.microsoft.com/office/drawing/2014/main" id="{9248A8B1-0AE4-4281-8BBD-8C66F0AB20C6}"/>
+                <a16:creationId xmlns:a16="http://schemas.microsoft.com/office/drawing/2014/main" xmlns="" id="{9248A8B1-0AE4-4281-8BBD-8C66F0AB20C6}"/>
               </a:ext>
             </a:extLst>
           </p:cNvPr>
@@ -6099,7 +6242,7 @@
           <p:cNvPr id="4" name="Segnaposto contenuto 3">
             <a:extLst>
               <a:ext uri="{FF2B5EF4-FFF2-40B4-BE49-F238E27FC236}">
-                <a16:creationId xmlns:a16="http://schemas.microsoft.com/office/drawing/2014/main" id="{7CA8F3C0-4DC8-4B42-96EC-8F4C521EA242}"/>
+                <a16:creationId xmlns:a16="http://schemas.microsoft.com/office/drawing/2014/main" xmlns="" id="{7CA8F3C0-4DC8-4B42-96EC-8F4C521EA242}"/>
               </a:ext>
             </a:extLst>
           </p:cNvPr>
@@ -6161,7 +6304,7 @@
           <p:cNvPr id="5" name="Titolo 1">
             <a:extLst>
               <a:ext uri="{FF2B5EF4-FFF2-40B4-BE49-F238E27FC236}">
-                <a16:creationId xmlns:a16="http://schemas.microsoft.com/office/drawing/2014/main" id="{7CBDCA69-D557-412E-B456-ACDB6F34C651}"/>
+                <a16:creationId xmlns:a16="http://schemas.microsoft.com/office/drawing/2014/main" xmlns="" id="{7CBDCA69-D557-412E-B456-ACDB6F34C651}"/>
               </a:ext>
             </a:extLst>
           </p:cNvPr>
@@ -6172,7 +6315,7 @@
         </p:nvSpPr>
         <p:spPr>
           <a:xfrm>
-            <a:off x="0" y="4916"/>
+            <a:off x="6951" y="0"/>
             <a:ext cx="3343275" cy="810030"/>
           </a:xfrm>
           <a:prstGeom prst="rect">
@@ -6272,7 +6415,7 @@
           <p:cNvPr id="6" name="CasellaDiTesto 5">
             <a:extLst>
               <a:ext uri="{FF2B5EF4-FFF2-40B4-BE49-F238E27FC236}">
-                <a16:creationId xmlns:a16="http://schemas.microsoft.com/office/drawing/2014/main" id="{FA6CE7F1-82D5-4C0A-806D-F25D5B7695A0}"/>
+                <a16:creationId xmlns:a16="http://schemas.microsoft.com/office/drawing/2014/main" xmlns="" id="{FA6CE7F1-82D5-4C0A-806D-F25D5B7695A0}"/>
               </a:ext>
             </a:extLst>
           </p:cNvPr>
@@ -6312,13 +6455,13 @@
   <p:clrMapOvr>
     <a:masterClrMapping/>
   </p:clrMapOvr>
-  <mc:AlternateContent xmlns:mc="http://schemas.openxmlformats.org/markup-compatibility/2006">
-    <mc:Choice xmlns:p14="http://schemas.microsoft.com/office/powerpoint/2010/main" Requires="p14">
+  <mc:AlternateContent xmlns:mc="http://schemas.openxmlformats.org/markup-compatibility/2006" xmlns:p14="http://schemas.microsoft.com/office/powerpoint/2010/main">
+    <mc:Choice Requires="p14">
       <p:transition spd="slow" p14:dur="1750">
         <p:fade/>
       </p:transition>
     </mc:Choice>
-    <mc:Fallback>
+    <mc:Fallback xmlns="">
       <p:transition spd="slow">
         <p:fade/>
       </p:transition>
@@ -6349,7 +6492,7 @@
           <p:cNvPr id="10" name="Immagine 9">
             <a:extLst>
               <a:ext uri="{FF2B5EF4-FFF2-40B4-BE49-F238E27FC236}">
-                <a16:creationId xmlns:a16="http://schemas.microsoft.com/office/drawing/2014/main" id="{EAD68B1E-8D82-4147-AE6A-40C22813F044}"/>
+                <a16:creationId xmlns:a16="http://schemas.microsoft.com/office/drawing/2014/main" xmlns="" id="{EAD68B1E-8D82-4147-AE6A-40C22813F044}"/>
               </a:ext>
             </a:extLst>
           </p:cNvPr>
@@ -6379,7 +6522,7 @@
           <p:cNvPr id="6" name="Immagine 5">
             <a:extLst>
               <a:ext uri="{FF2B5EF4-FFF2-40B4-BE49-F238E27FC236}">
-                <a16:creationId xmlns:a16="http://schemas.microsoft.com/office/drawing/2014/main" id="{23440B85-C09C-4640-B492-AB9090AA62C2}"/>
+                <a16:creationId xmlns:a16="http://schemas.microsoft.com/office/drawing/2014/main" xmlns="" id="{23440B85-C09C-4640-B492-AB9090AA62C2}"/>
               </a:ext>
             </a:extLst>
           </p:cNvPr>
@@ -6409,7 +6552,7 @@
           <p:cNvPr id="8" name="Immagine 7">
             <a:extLst>
               <a:ext uri="{FF2B5EF4-FFF2-40B4-BE49-F238E27FC236}">
-                <a16:creationId xmlns:a16="http://schemas.microsoft.com/office/drawing/2014/main" id="{F082D77D-7E90-4A1B-902A-BF22BD8BF999}"/>
+                <a16:creationId xmlns:a16="http://schemas.microsoft.com/office/drawing/2014/main" xmlns="" id="{F082D77D-7E90-4A1B-902A-BF22BD8BF999}"/>
               </a:ext>
             </a:extLst>
           </p:cNvPr>
@@ -6439,7 +6582,7 @@
           <p:cNvPr id="2" name="Titolo 1">
             <a:extLst>
               <a:ext uri="{FF2B5EF4-FFF2-40B4-BE49-F238E27FC236}">
-                <a16:creationId xmlns:a16="http://schemas.microsoft.com/office/drawing/2014/main" id="{787CD2E0-40ED-4B43-AB7C-DE40388F2541}"/>
+                <a16:creationId xmlns:a16="http://schemas.microsoft.com/office/drawing/2014/main" xmlns="" id="{787CD2E0-40ED-4B43-AB7C-DE40388F2541}"/>
               </a:ext>
             </a:extLst>
           </p:cNvPr>
@@ -6476,7 +6619,7 @@
           <p:cNvPr id="4" name="CasellaDiTesto 3">
             <a:extLst>
               <a:ext uri="{FF2B5EF4-FFF2-40B4-BE49-F238E27FC236}">
-                <a16:creationId xmlns:a16="http://schemas.microsoft.com/office/drawing/2014/main" id="{559CEFF0-CDEE-43E6-9168-74936CDF43D4}"/>
+                <a16:creationId xmlns:a16="http://schemas.microsoft.com/office/drawing/2014/main" xmlns="" id="{559CEFF0-CDEE-43E6-9168-74936CDF43D4}"/>
               </a:ext>
             </a:extLst>
           </p:cNvPr>
@@ -6515,7 +6658,7 @@
           <p:cNvPr id="5" name="CasellaDiTesto 4">
             <a:extLst>
               <a:ext uri="{FF2B5EF4-FFF2-40B4-BE49-F238E27FC236}">
-                <a16:creationId xmlns:a16="http://schemas.microsoft.com/office/drawing/2014/main" id="{6ED36F17-D8C1-443E-9600-623A04EAC80B}"/>
+                <a16:creationId xmlns:a16="http://schemas.microsoft.com/office/drawing/2014/main" xmlns="" id="{6ED36F17-D8C1-443E-9600-623A04EAC80B}"/>
               </a:ext>
             </a:extLst>
           </p:cNvPr>
@@ -6559,13 +6702,13 @@
   <p:clrMapOvr>
     <a:masterClrMapping/>
   </p:clrMapOvr>
-  <mc:AlternateContent xmlns:mc="http://schemas.openxmlformats.org/markup-compatibility/2006">
-    <mc:Choice xmlns:p14="http://schemas.microsoft.com/office/powerpoint/2010/main" Requires="p14">
+  <mc:AlternateContent xmlns:mc="http://schemas.openxmlformats.org/markup-compatibility/2006" xmlns:p14="http://schemas.microsoft.com/office/powerpoint/2010/main">
+    <mc:Choice Requires="p14">
       <p:transition spd="slow" p14:dur="1750">
         <p:fade/>
       </p:transition>
     </mc:Choice>
-    <mc:Fallback>
+    <mc:Fallback xmlns="">
       <p:transition spd="slow">
         <p:fade/>
       </p:transition>
@@ -6620,7 +6763,7 @@
           <p:cNvPr id="3" name="Segnaposto contenuto 2">
             <a:extLst>
               <a:ext uri="{FF2B5EF4-FFF2-40B4-BE49-F238E27FC236}">
-                <a16:creationId xmlns:a16="http://schemas.microsoft.com/office/drawing/2014/main" id="{7709EE42-6FE8-4B0D-8DCE-2BF9AFEAA31C}"/>
+                <a16:creationId xmlns:a16="http://schemas.microsoft.com/office/drawing/2014/main" xmlns="" id="{7709EE42-6FE8-4B0D-8DCE-2BF9AFEAA31C}"/>
               </a:ext>
             </a:extLst>
           </p:cNvPr>
@@ -6684,10 +6827,10 @@
           <p:cNvPr id="11" name="Freeform 31">
             <a:extLst>
               <a:ext uri="{FF2B5EF4-FFF2-40B4-BE49-F238E27FC236}">
-                <a16:creationId xmlns:a16="http://schemas.microsoft.com/office/drawing/2014/main" id="{D6CEF2A9-EF08-4FB3-AFFB-C5F77AB6E028}"/>
+                <a16:creationId xmlns:a16="http://schemas.microsoft.com/office/drawing/2014/main" xmlns="" id="{D6CEF2A9-EF08-4FB3-AFFB-C5F77AB6E028}"/>
               </a:ext>
               <a:ext uri="{C183D7F6-B498-43B3-948B-1728B52AA6E4}">
-                <adec:decorative xmlns:adec="http://schemas.microsoft.com/office/drawing/2017/decorative" val="1"/>
+                <adec:decorative xmlns:adec="http://schemas.microsoft.com/office/drawing/2017/decorative" xmlns="" val="1"/>
               </a:ext>
             </a:extLst>
           </p:cNvPr>
@@ -6697,7 +6840,7 @@
           <p:nvPr>
             <p:extLst>
               <p:ext uri="{386F3935-93C4-4BCD-93E2-E3B085C9AB24}">
-                <p16:designElem xmlns:p16="http://schemas.microsoft.com/office/powerpoint/2015/main" val="1"/>
+                <p16:designElem xmlns:p16="http://schemas.microsoft.com/office/powerpoint/2015/main" xmlns="" val="1"/>
               </p:ext>
             </p:extLst>
           </p:nvPr>
@@ -7036,10 +7179,10 @@
           <p:cNvPr id="13" name="Rectangle 12">
             <a:extLst>
               <a:ext uri="{FF2B5EF4-FFF2-40B4-BE49-F238E27FC236}">
-                <a16:creationId xmlns:a16="http://schemas.microsoft.com/office/drawing/2014/main" id="{4109C3C2-C0A8-4559-8462-8007573DF44C}"/>
+                <a16:creationId xmlns:a16="http://schemas.microsoft.com/office/drawing/2014/main" xmlns="" id="{4109C3C2-C0A8-4559-8462-8007573DF44C}"/>
               </a:ext>
               <a:ext uri="{C183D7F6-B498-43B3-948B-1728B52AA6E4}">
-                <adec:decorative xmlns:adec="http://schemas.microsoft.com/office/drawing/2017/decorative" val="1"/>
+                <adec:decorative xmlns:adec="http://schemas.microsoft.com/office/drawing/2017/decorative" xmlns="" val="1"/>
               </a:ext>
             </a:extLst>
           </p:cNvPr>
@@ -7049,7 +7192,7 @@
           <p:nvPr>
             <p:extLst>
               <p:ext uri="{386F3935-93C4-4BCD-93E2-E3B085C9AB24}">
-                <p16:designElem xmlns:p16="http://schemas.microsoft.com/office/powerpoint/2015/main" val="1"/>
+                <p16:designElem xmlns:p16="http://schemas.microsoft.com/office/powerpoint/2015/main" xmlns="" val="1"/>
               </p:ext>
             </p:extLst>
           </p:nvPr>
@@ -7099,10 +7242,10 @@
           <p:cNvPr id="15" name="Freeform 5">
             <a:extLst>
               <a:ext uri="{FF2B5EF4-FFF2-40B4-BE49-F238E27FC236}">
-                <a16:creationId xmlns:a16="http://schemas.microsoft.com/office/drawing/2014/main" id="{4C535542-B72A-4DE0-BE5A-5EA00508C77D}"/>
+                <a16:creationId xmlns:a16="http://schemas.microsoft.com/office/drawing/2014/main" xmlns="" id="{4C535542-B72A-4DE0-BE5A-5EA00508C77D}"/>
               </a:ext>
               <a:ext uri="{C183D7F6-B498-43B3-948B-1728B52AA6E4}">
-                <adec:decorative xmlns:adec="http://schemas.microsoft.com/office/drawing/2017/decorative" val="1"/>
+                <adec:decorative xmlns:adec="http://schemas.microsoft.com/office/drawing/2017/decorative" xmlns="" val="1"/>
               </a:ext>
             </a:extLst>
           </p:cNvPr>
@@ -7112,7 +7255,7 @@
           <p:nvPr>
             <p:extLst>
               <p:ext uri="{386F3935-93C4-4BCD-93E2-E3B085C9AB24}">
-                <p16:designElem xmlns:p16="http://schemas.microsoft.com/office/powerpoint/2015/main" val="1"/>
+                <p16:designElem xmlns:p16="http://schemas.microsoft.com/office/powerpoint/2015/main" xmlns="" val="1"/>
               </p:ext>
             </p:extLst>
           </p:nvPr>
@@ -7300,7 +7443,7 @@
           <p:cNvPr id="6" name="Immagine 5">
             <a:extLst>
               <a:ext uri="{FF2B5EF4-FFF2-40B4-BE49-F238E27FC236}">
-                <a16:creationId xmlns:a16="http://schemas.microsoft.com/office/drawing/2014/main" id="{EAEB543D-6B64-476B-BB8D-4A25DD8D3071}"/>
+                <a16:creationId xmlns:a16="http://schemas.microsoft.com/office/drawing/2014/main" xmlns="" id="{EAEB543D-6B64-476B-BB8D-4A25DD8D3071}"/>
               </a:ext>
             </a:extLst>
           </p:cNvPr>
@@ -7330,10 +7473,10 @@
           <p:cNvPr id="17" name="Rectangle 16">
             <a:extLst>
               <a:ext uri="{FF2B5EF4-FFF2-40B4-BE49-F238E27FC236}">
-                <a16:creationId xmlns:a16="http://schemas.microsoft.com/office/drawing/2014/main" id="{11DF0705-615B-4CF3-A16F-8C14680D8BA6}"/>
+                <a16:creationId xmlns:a16="http://schemas.microsoft.com/office/drawing/2014/main" xmlns="" id="{11DF0705-615B-4CF3-A16F-8C14680D8BA6}"/>
               </a:ext>
               <a:ext uri="{C183D7F6-B498-43B3-948B-1728B52AA6E4}">
-                <adec:decorative xmlns:adec="http://schemas.microsoft.com/office/drawing/2017/decorative" val="1"/>
+                <adec:decorative xmlns:adec="http://schemas.microsoft.com/office/drawing/2017/decorative" xmlns="" val="1"/>
               </a:ext>
             </a:extLst>
           </p:cNvPr>
@@ -7343,7 +7486,7 @@
           <p:nvPr>
             <p:extLst>
               <p:ext uri="{386F3935-93C4-4BCD-93E2-E3B085C9AB24}">
-                <p16:designElem xmlns:p16="http://schemas.microsoft.com/office/powerpoint/2015/main" val="1"/>
+                <p16:designElem xmlns:p16="http://schemas.microsoft.com/office/powerpoint/2015/main" xmlns="" val="1"/>
               </p:ext>
             </p:extLst>
           </p:nvPr>
@@ -7383,7 +7526,7 @@
           <p:cNvPr id="12" name="CasellaDiTesto 11">
             <a:extLst>
               <a:ext uri="{FF2B5EF4-FFF2-40B4-BE49-F238E27FC236}">
-                <a16:creationId xmlns:a16="http://schemas.microsoft.com/office/drawing/2014/main" id="{8D87622C-C709-4EB8-AE1E-E6C58A4BAF5C}"/>
+                <a16:creationId xmlns:a16="http://schemas.microsoft.com/office/drawing/2014/main" xmlns="" id="{8D87622C-C709-4EB8-AE1E-E6C58A4BAF5C}"/>
               </a:ext>
             </a:extLst>
           </p:cNvPr>
@@ -7422,7 +7565,7 @@
           <p:cNvPr id="14" name="Titolo 1">
             <a:extLst>
               <a:ext uri="{FF2B5EF4-FFF2-40B4-BE49-F238E27FC236}">
-                <a16:creationId xmlns:a16="http://schemas.microsoft.com/office/drawing/2014/main" id="{1BBEE441-2E56-48C3-8630-47FCBE68367E}"/>
+                <a16:creationId xmlns:a16="http://schemas.microsoft.com/office/drawing/2014/main" xmlns="" id="{1BBEE441-2E56-48C3-8630-47FCBE68367E}"/>
               </a:ext>
             </a:extLst>
           </p:cNvPr>
@@ -7459,7 +7602,7 @@
           <p:cNvPr id="7" name="CasellaDiTesto 6">
             <a:extLst>
               <a:ext uri="{FF2B5EF4-FFF2-40B4-BE49-F238E27FC236}">
-                <a16:creationId xmlns:a16="http://schemas.microsoft.com/office/drawing/2014/main" id="{F0B1C700-BFBC-49C1-90A6-778B75099917}"/>
+                <a16:creationId xmlns:a16="http://schemas.microsoft.com/office/drawing/2014/main" xmlns="" id="{F0B1C700-BFBC-49C1-90A6-778B75099917}"/>
               </a:ext>
             </a:extLst>
           </p:cNvPr>
@@ -7500,13 +7643,13 @@
   <p:clrMapOvr>
     <a:masterClrMapping/>
   </p:clrMapOvr>
-  <mc:AlternateContent xmlns:mc="http://schemas.openxmlformats.org/markup-compatibility/2006">
-    <mc:Choice xmlns:p14="http://schemas.microsoft.com/office/powerpoint/2010/main" Requires="p14">
+  <mc:AlternateContent xmlns:mc="http://schemas.openxmlformats.org/markup-compatibility/2006" xmlns:p14="http://schemas.microsoft.com/office/powerpoint/2010/main">
+    <mc:Choice Requires="p14">
       <p:transition spd="slow" p14:dur="1750">
         <p:fade/>
       </p:transition>
     </mc:Choice>
-    <mc:Fallback>
+    <mc:Fallback xmlns="">
       <p:transition spd="slow">
         <p:fade/>
       </p:transition>
@@ -7561,7 +7704,7 @@
           <p:cNvPr id="3" name="Segnaposto contenuto 2">
             <a:extLst>
               <a:ext uri="{FF2B5EF4-FFF2-40B4-BE49-F238E27FC236}">
-                <a16:creationId xmlns:a16="http://schemas.microsoft.com/office/drawing/2014/main" id="{973B23F4-7AED-4123-AE56-9D3E68DF4EA4}"/>
+                <a16:creationId xmlns:a16="http://schemas.microsoft.com/office/drawing/2014/main" xmlns="" id="{973B23F4-7AED-4123-AE56-9D3E68DF4EA4}"/>
               </a:ext>
             </a:extLst>
           </p:cNvPr>
@@ -7625,10 +7768,10 @@
           <p:cNvPr id="10" name="Freeform 31">
             <a:extLst>
               <a:ext uri="{FF2B5EF4-FFF2-40B4-BE49-F238E27FC236}">
-                <a16:creationId xmlns:a16="http://schemas.microsoft.com/office/drawing/2014/main" id="{D6CEF2A9-EF08-4FB3-AFFB-C5F77AB6E028}"/>
+                <a16:creationId xmlns:a16="http://schemas.microsoft.com/office/drawing/2014/main" xmlns="" id="{D6CEF2A9-EF08-4FB3-AFFB-C5F77AB6E028}"/>
               </a:ext>
               <a:ext uri="{C183D7F6-B498-43B3-948B-1728B52AA6E4}">
-                <adec:decorative xmlns:adec="http://schemas.microsoft.com/office/drawing/2017/decorative" val="1"/>
+                <adec:decorative xmlns:adec="http://schemas.microsoft.com/office/drawing/2017/decorative" xmlns="" val="1"/>
               </a:ext>
             </a:extLst>
           </p:cNvPr>
@@ -7638,7 +7781,7 @@
           <p:nvPr>
             <p:extLst>
               <p:ext uri="{386F3935-93C4-4BCD-93E2-E3B085C9AB24}">
-                <p16:designElem xmlns:p16="http://schemas.microsoft.com/office/powerpoint/2015/main" val="1"/>
+                <p16:designElem xmlns:p16="http://schemas.microsoft.com/office/powerpoint/2015/main" xmlns="" val="1"/>
               </p:ext>
             </p:extLst>
           </p:nvPr>
@@ -7977,10 +8120,10 @@
           <p:cNvPr id="12" name="Rectangle 11">
             <a:extLst>
               <a:ext uri="{FF2B5EF4-FFF2-40B4-BE49-F238E27FC236}">
-                <a16:creationId xmlns:a16="http://schemas.microsoft.com/office/drawing/2014/main" id="{4109C3C2-C0A8-4559-8462-8007573DF44C}"/>
+                <a16:creationId xmlns:a16="http://schemas.microsoft.com/office/drawing/2014/main" xmlns="" id="{4109C3C2-C0A8-4559-8462-8007573DF44C}"/>
               </a:ext>
               <a:ext uri="{C183D7F6-B498-43B3-948B-1728B52AA6E4}">
-                <adec:decorative xmlns:adec="http://schemas.microsoft.com/office/drawing/2017/decorative" val="1"/>
+                <adec:decorative xmlns:adec="http://schemas.microsoft.com/office/drawing/2017/decorative" xmlns="" val="1"/>
               </a:ext>
             </a:extLst>
           </p:cNvPr>
@@ -7990,7 +8133,7 @@
           <p:nvPr>
             <p:extLst>
               <p:ext uri="{386F3935-93C4-4BCD-93E2-E3B085C9AB24}">
-                <p16:designElem xmlns:p16="http://schemas.microsoft.com/office/powerpoint/2015/main" val="1"/>
+                <p16:designElem xmlns:p16="http://schemas.microsoft.com/office/powerpoint/2015/main" xmlns="" val="1"/>
               </p:ext>
             </p:extLst>
           </p:nvPr>
@@ -8040,10 +8183,10 @@
           <p:cNvPr id="14" name="Freeform 5">
             <a:extLst>
               <a:ext uri="{FF2B5EF4-FFF2-40B4-BE49-F238E27FC236}">
-                <a16:creationId xmlns:a16="http://schemas.microsoft.com/office/drawing/2014/main" id="{4C535542-B72A-4DE0-BE5A-5EA00508C77D}"/>
+                <a16:creationId xmlns:a16="http://schemas.microsoft.com/office/drawing/2014/main" xmlns="" id="{4C535542-B72A-4DE0-BE5A-5EA00508C77D}"/>
               </a:ext>
               <a:ext uri="{C183D7F6-B498-43B3-948B-1728B52AA6E4}">
-                <adec:decorative xmlns:adec="http://schemas.microsoft.com/office/drawing/2017/decorative" val="1"/>
+                <adec:decorative xmlns:adec="http://schemas.microsoft.com/office/drawing/2017/decorative" xmlns="" val="1"/>
               </a:ext>
             </a:extLst>
           </p:cNvPr>
@@ -8053,7 +8196,7 @@
           <p:nvPr>
             <p:extLst>
               <p:ext uri="{386F3935-93C4-4BCD-93E2-E3B085C9AB24}">
-                <p16:designElem xmlns:p16="http://schemas.microsoft.com/office/powerpoint/2015/main" val="1"/>
+                <p16:designElem xmlns:p16="http://schemas.microsoft.com/office/powerpoint/2015/main" xmlns="" val="1"/>
               </p:ext>
             </p:extLst>
           </p:nvPr>
@@ -8241,7 +8384,7 @@
           <p:cNvPr id="5" name="Immagine 4">
             <a:extLst>
               <a:ext uri="{FF2B5EF4-FFF2-40B4-BE49-F238E27FC236}">
-                <a16:creationId xmlns:a16="http://schemas.microsoft.com/office/drawing/2014/main" id="{06F61A49-3B18-485B-AA7D-75E78D46A673}"/>
+                <a16:creationId xmlns:a16="http://schemas.microsoft.com/office/drawing/2014/main" xmlns="" id="{06F61A49-3B18-485B-AA7D-75E78D46A673}"/>
               </a:ext>
             </a:extLst>
           </p:cNvPr>
@@ -8272,10 +8415,10 @@
           <p:cNvPr id="16" name="Rectangle 15">
             <a:extLst>
               <a:ext uri="{FF2B5EF4-FFF2-40B4-BE49-F238E27FC236}">
-                <a16:creationId xmlns:a16="http://schemas.microsoft.com/office/drawing/2014/main" id="{11DF0705-615B-4CF3-A16F-8C14680D8BA6}"/>
+                <a16:creationId xmlns:a16="http://schemas.microsoft.com/office/drawing/2014/main" xmlns="" id="{11DF0705-615B-4CF3-A16F-8C14680D8BA6}"/>
               </a:ext>
               <a:ext uri="{C183D7F6-B498-43B3-948B-1728B52AA6E4}">
-                <adec:decorative xmlns:adec="http://schemas.microsoft.com/office/drawing/2017/decorative" val="1"/>
+                <adec:decorative xmlns:adec="http://schemas.microsoft.com/office/drawing/2017/decorative" xmlns="" val="1"/>
               </a:ext>
             </a:extLst>
           </p:cNvPr>
@@ -8285,7 +8428,7 @@
           <p:nvPr>
             <p:extLst>
               <p:ext uri="{386F3935-93C4-4BCD-93E2-E3B085C9AB24}">
-                <p16:designElem xmlns:p16="http://schemas.microsoft.com/office/powerpoint/2015/main" val="1"/>
+                <p16:designElem xmlns:p16="http://schemas.microsoft.com/office/powerpoint/2015/main" xmlns="" val="1"/>
               </p:ext>
             </p:extLst>
           </p:nvPr>
@@ -8325,7 +8468,7 @@
           <p:cNvPr id="9" name="CasellaDiTesto 8">
             <a:extLst>
               <a:ext uri="{FF2B5EF4-FFF2-40B4-BE49-F238E27FC236}">
-                <a16:creationId xmlns:a16="http://schemas.microsoft.com/office/drawing/2014/main" id="{BC9D2EDC-6A9E-42FA-8917-FCF7BBE68D8E}"/>
+                <a16:creationId xmlns:a16="http://schemas.microsoft.com/office/drawing/2014/main" xmlns="" id="{BC9D2EDC-6A9E-42FA-8917-FCF7BBE68D8E}"/>
               </a:ext>
             </a:extLst>
           </p:cNvPr>
@@ -8364,7 +8507,7 @@
           <p:cNvPr id="13" name="Titolo 1">
             <a:extLst>
               <a:ext uri="{FF2B5EF4-FFF2-40B4-BE49-F238E27FC236}">
-                <a16:creationId xmlns:a16="http://schemas.microsoft.com/office/drawing/2014/main" id="{965DD857-F11F-43FC-9C39-BD6016FDC67A}"/>
+                <a16:creationId xmlns:a16="http://schemas.microsoft.com/office/drawing/2014/main" xmlns="" id="{965DD857-F11F-43FC-9C39-BD6016FDC67A}"/>
               </a:ext>
             </a:extLst>
           </p:cNvPr>
@@ -8401,7 +8544,7 @@
           <p:cNvPr id="15" name="CasellaDiTesto 14">
             <a:extLst>
               <a:ext uri="{FF2B5EF4-FFF2-40B4-BE49-F238E27FC236}">
-                <a16:creationId xmlns:a16="http://schemas.microsoft.com/office/drawing/2014/main" id="{804B5F14-9759-4E99-83EC-B47B3EC79557}"/>
+                <a16:creationId xmlns:a16="http://schemas.microsoft.com/office/drawing/2014/main" xmlns="" id="{804B5F14-9759-4E99-83EC-B47B3EC79557}"/>
               </a:ext>
             </a:extLst>
           </p:cNvPr>
@@ -8442,13 +8585,13 @@
   <p:clrMapOvr>
     <a:masterClrMapping/>
   </p:clrMapOvr>
-  <mc:AlternateContent xmlns:mc="http://schemas.openxmlformats.org/markup-compatibility/2006">
-    <mc:Choice xmlns:p14="http://schemas.microsoft.com/office/powerpoint/2010/main" Requires="p14">
+  <mc:AlternateContent xmlns:mc="http://schemas.openxmlformats.org/markup-compatibility/2006" xmlns:p14="http://schemas.microsoft.com/office/powerpoint/2010/main">
+    <mc:Choice Requires="p14">
       <p:transition spd="slow" p14:dur="1750">
         <p:fade/>
       </p:transition>
     </mc:Choice>
-    <mc:Fallback>
+    <mc:Fallback xmlns="">
       <p:transition spd="slow">
         <p:fade/>
       </p:transition>
@@ -8476,13 +8619,7 @@
       </p:grpSpPr>
       <p:sp>
         <p:nvSpPr>
-          <p:cNvPr id="2" name="Titolo 1">
-            <a:extLst>
-              <a:ext uri="{FF2B5EF4-FFF2-40B4-BE49-F238E27FC236}">
-                <a16:creationId xmlns:a16="http://schemas.microsoft.com/office/drawing/2014/main" id="{4DBA7C89-E1D5-4010-9ECC-75B75E24AA18}"/>
-              </a:ext>
-            </a:extLst>
-          </p:cNvPr>
+          <p:cNvPr id="2" name="Titolo 1"/>
           <p:cNvSpPr>
             <a:spLocks noGrp="1"/>
           </p:cNvSpPr>
@@ -8495,104 +8632,420 @@
           <a:bodyPr/>
           <a:lstStyle/>
           <a:p>
-            <a:endParaRPr lang="it-IT"/>
-          </a:p>
-        </p:txBody>
-      </p:sp>
-      <p:sp>
-        <p:nvSpPr>
-          <p:cNvPr id="3" name="Segnaposto contenuto 2">
-            <a:extLst>
-              <a:ext uri="{FF2B5EF4-FFF2-40B4-BE49-F238E27FC236}">
-                <a16:creationId xmlns:a16="http://schemas.microsoft.com/office/drawing/2014/main" id="{029A8546-28A6-4501-83D5-60C1026E1F99}"/>
-              </a:ext>
-            </a:extLst>
-          </p:cNvPr>
-          <p:cNvSpPr>
-            <a:spLocks noGrp="1"/>
-          </p:cNvSpPr>
-          <p:nvPr>
-            <p:ph idx="1"/>
-          </p:nvPr>
-        </p:nvSpPr>
-        <p:spPr/>
-        <p:txBody>
-          <a:bodyPr/>
-          <a:lstStyle/>
-          <a:p>
-            <a:endParaRPr lang="it-IT"/>
+            <a:r>
+              <a:rPr lang="it-IT" sz="5000" b="1" dirty="0" smtClean="0"/>
+              <a:t>Progetto prototipo </a:t>
+            </a:r>
+            <a:r>
+              <a:rPr lang="it-IT" sz="5000" b="1" dirty="0" err="1" smtClean="0"/>
+              <a:t>App</a:t>
+            </a:r>
+            <a:endParaRPr lang="it-IT" sz="5000" b="1" dirty="0"/>
           </a:p>
         </p:txBody>
       </p:sp>
       <p:pic>
         <p:nvPicPr>
-          <p:cNvPr id="2050" name="Picture 2" descr="E' il BlackOutTuesday: i profili Instagram si tingono di nero per  combattere il razzismo">
-            <a:extLst>
-              <a:ext uri="{FF2B5EF4-FFF2-40B4-BE49-F238E27FC236}">
-                <a16:creationId xmlns:a16="http://schemas.microsoft.com/office/drawing/2014/main" id="{DC5687C5-E9FA-4A35-A989-605D046F61C6}"/>
-              </a:ext>
-            </a:extLst>
-          </p:cNvPr>
+          <p:cNvPr id="4" name="Segnaposto contenuto 3"/>
           <p:cNvPicPr>
-            <a:picLocks noChangeAspect="1" noChangeArrowheads="1"/>
+            <a:picLocks noGrp="1" noChangeAspect="1"/>
           </p:cNvPicPr>
-          <p:nvPr/>
+          <p:nvPr>
+            <p:ph idx="1"/>
+          </p:nvPr>
         </p:nvPicPr>
         <p:blipFill>
-          <a:blip r:embed="rId2">
-            <a:extLst>
-              <a:ext uri="{28A0092B-C50C-407E-A947-70E740481C1C}">
-                <a14:useLocalDpi xmlns:a14="http://schemas.microsoft.com/office/drawing/2010/main" val="0"/>
-              </a:ext>
-            </a:extLst>
-          </a:blip>
-          <a:srcRect/>
+          <a:blip r:embed="rId2"/>
           <a:stretch>
             <a:fillRect/>
           </a:stretch>
         </p:blipFill>
-        <p:spPr bwMode="auto">
+        <p:spPr>
           <a:xfrm>
-            <a:off x="0" y="0"/>
-            <a:ext cx="12192000" cy="6858000"/>
+            <a:off x="1737785" y="1620564"/>
+            <a:ext cx="8468895" cy="4627836"/>
           </a:xfrm>
           <a:prstGeom prst="rect">
             <a:avLst/>
           </a:prstGeom>
-          <a:noFill/>
-          <a:extLst>
-            <a:ext uri="{909E8E84-426E-40DD-AFC4-6F175D3DCCD1}">
-              <a14:hiddenFill xmlns:a14="http://schemas.microsoft.com/office/drawing/2010/main">
-                <a:solidFill>
-                  <a:srgbClr val="FFFFFF"/>
-                </a:solidFill>
-              </a14:hiddenFill>
-            </a:ext>
-          </a:extLst>
         </p:spPr>
       </p:pic>
     </p:spTree>
     <p:extLst>
       <p:ext uri="{BB962C8B-B14F-4D97-AF65-F5344CB8AC3E}">
-        <p14:creationId xmlns:p14="http://schemas.microsoft.com/office/powerpoint/2010/main" val="3611896384"/>
+        <p14:creationId xmlns:p14="http://schemas.microsoft.com/office/powerpoint/2010/main" val="641674780"/>
       </p:ext>
     </p:extLst>
   </p:cSld>
   <p:clrMapOvr>
     <a:masterClrMapping/>
   </p:clrMapOvr>
-  <mc:AlternateContent xmlns:mc="http://schemas.openxmlformats.org/markup-compatibility/2006">
-    <mc:Choice xmlns:p14="http://schemas.microsoft.com/office/powerpoint/2010/main" Requires="p14">
-      <p:transition spd="slow" p14:dur="2750">
-        <p:fade/>
-      </p:transition>
-    </mc:Choice>
-    <mc:Fallback>
-      <p:transition spd="slow">
-        <p:fade/>
-      </p:transition>
-    </mc:Fallback>
-  </mc:AlternateContent>
+</p:sld>
+</file>
+
+<file path=ppt/slides/slide7.xml><?xml version="1.0" encoding="utf-8"?>
+<p:sld xmlns:a="http://schemas.openxmlformats.org/drawingml/2006/main" xmlns:r="http://schemas.openxmlformats.org/officeDocument/2006/relationships" xmlns:p="http://schemas.openxmlformats.org/presentationml/2006/main">
+  <p:cSld>
+    <p:spTree>
+      <p:nvGrpSpPr>
+        <p:cNvPr id="1" name=""/>
+        <p:cNvGrpSpPr/>
+        <p:nvPr/>
+      </p:nvGrpSpPr>
+      <p:grpSpPr>
+        <a:xfrm>
+          <a:off x="0" y="0"/>
+          <a:ext cx="0" cy="0"/>
+          <a:chOff x="0" y="0"/>
+          <a:chExt cx="0" cy="0"/>
+        </a:xfrm>
+      </p:grpSpPr>
+      <p:sp>
+        <p:nvSpPr>
+          <p:cNvPr id="2" name="Titolo 1"/>
+          <p:cNvSpPr>
+            <a:spLocks noGrp="1"/>
+          </p:cNvSpPr>
+          <p:nvPr>
+            <p:ph type="title"/>
+          </p:nvPr>
+        </p:nvSpPr>
+        <p:spPr/>
+        <p:txBody>
+          <a:bodyPr/>
+          <a:lstStyle/>
+          <a:p>
+            <a:r>
+              <a:rPr lang="it-IT" sz="5000" b="1" dirty="0" smtClean="0"/>
+              <a:t>Funzionalità e finestre</a:t>
+            </a:r>
+            <a:endParaRPr lang="it-IT" sz="5000" b="1" dirty="0"/>
+          </a:p>
+        </p:txBody>
+      </p:sp>
+      <p:pic>
+        <p:nvPicPr>
+          <p:cNvPr id="5" name="Segnaposto contenuto 4"/>
+          <p:cNvPicPr>
+            <a:picLocks noGrp="1" noChangeAspect="1"/>
+          </p:cNvPicPr>
+          <p:nvPr>
+            <p:ph sz="half" idx="1"/>
+          </p:nvPr>
+        </p:nvPicPr>
+        <p:blipFill>
+          <a:blip r:embed="rId2"/>
+          <a:stretch>
+            <a:fillRect/>
+          </a:stretch>
+        </p:blipFill>
+        <p:spPr>
+          <a:xfrm>
+            <a:off x="216963" y="2056092"/>
+            <a:ext cx="5437530" cy="3273332"/>
+          </a:xfrm>
+          <a:prstGeom prst="rect">
+            <a:avLst/>
+          </a:prstGeom>
+        </p:spPr>
+      </p:pic>
+      <p:sp>
+        <p:nvSpPr>
+          <p:cNvPr id="4" name="Segnaposto contenuto 3"/>
+          <p:cNvSpPr>
+            <a:spLocks noGrp="1"/>
+          </p:cNvSpPr>
+          <p:nvPr>
+            <p:ph sz="half" idx="2"/>
+          </p:nvPr>
+        </p:nvSpPr>
+        <p:spPr>
+          <a:xfrm>
+            <a:off x="6684223" y="2052725"/>
+            <a:ext cx="4396341" cy="3433675"/>
+          </a:xfrm>
+        </p:spPr>
+        <p:txBody>
+          <a:bodyPr/>
+          <a:lstStyle/>
+          <a:p>
+            <a:r>
+              <a:rPr lang="it-IT" sz="2000" dirty="0" smtClean="0"/>
+              <a:t>Finestra Registrazione:</a:t>
+            </a:r>
+          </a:p>
+          <a:p>
+            <a:r>
+              <a:rPr lang="it-IT" sz="2000" dirty="0" smtClean="0"/>
+              <a:t>Permette all’utente di registrarsi all’interno della nostra </a:t>
+            </a:r>
+            <a:r>
+              <a:rPr lang="it-IT" sz="2000" dirty="0" err="1" smtClean="0"/>
+              <a:t>app</a:t>
+            </a:r>
+            <a:r>
+              <a:rPr lang="it-IT" sz="2000" dirty="0" smtClean="0"/>
+              <a:t>.</a:t>
+            </a:r>
+          </a:p>
+          <a:p>
+            <a:r>
+              <a:rPr lang="it-IT" sz="2000" dirty="0" smtClean="0"/>
+              <a:t>Ogni attributo dell’utente verrà poi salvato in una lista e su un file di testo che funge da database.</a:t>
+            </a:r>
+            <a:r>
+              <a:rPr lang="it-IT" dirty="0" smtClean="0"/>
+              <a:t/>
+            </a:r>
+            <a:br>
+              <a:rPr lang="it-IT" dirty="0" smtClean="0"/>
+            </a:br>
+            <a:endParaRPr lang="it-IT" dirty="0" smtClean="0"/>
+          </a:p>
+        </p:txBody>
+      </p:sp>
+    </p:spTree>
+    <p:extLst>
+      <p:ext uri="{BB962C8B-B14F-4D97-AF65-F5344CB8AC3E}">
+        <p14:creationId xmlns:p14="http://schemas.microsoft.com/office/powerpoint/2010/main" val="3389826802"/>
+      </p:ext>
+    </p:extLst>
+  </p:cSld>
+  <p:clrMapOvr>
+    <a:masterClrMapping/>
+  </p:clrMapOvr>
+</p:sld>
+</file>
+
+<file path=ppt/slides/slide8.xml><?xml version="1.0" encoding="utf-8"?>
+<p:sld xmlns:a="http://schemas.openxmlformats.org/drawingml/2006/main" xmlns:r="http://schemas.openxmlformats.org/officeDocument/2006/relationships" xmlns:p="http://schemas.openxmlformats.org/presentationml/2006/main">
+  <p:cSld>
+    <p:spTree>
+      <p:nvGrpSpPr>
+        <p:cNvPr id="1" name=""/>
+        <p:cNvGrpSpPr/>
+        <p:nvPr/>
+      </p:nvGrpSpPr>
+      <p:grpSpPr>
+        <a:xfrm>
+          <a:off x="0" y="0"/>
+          <a:ext cx="0" cy="0"/>
+          <a:chOff x="0" y="0"/>
+          <a:chExt cx="0" cy="0"/>
+        </a:xfrm>
+      </p:grpSpPr>
+      <p:sp>
+        <p:nvSpPr>
+          <p:cNvPr id="2" name="Titolo 1"/>
+          <p:cNvSpPr>
+            <a:spLocks noGrp="1"/>
+          </p:cNvSpPr>
+          <p:nvPr>
+            <p:ph type="title"/>
+          </p:nvPr>
+        </p:nvSpPr>
+        <p:spPr/>
+        <p:txBody>
+          <a:bodyPr/>
+          <a:lstStyle/>
+          <a:p>
+            <a:r>
+              <a:rPr lang="it-IT" sz="4400" b="1" dirty="0"/>
+              <a:t>Funzionalità e finestre</a:t>
+            </a:r>
+            <a:endParaRPr lang="it-IT" dirty="0"/>
+          </a:p>
+        </p:txBody>
+      </p:sp>
+      <p:pic>
+        <p:nvPicPr>
+          <p:cNvPr id="5" name="Segnaposto contenuto 4"/>
+          <p:cNvPicPr>
+            <a:picLocks noGrp="1" noChangeAspect="1"/>
+          </p:cNvPicPr>
+          <p:nvPr>
+            <p:ph sz="half" idx="1"/>
+          </p:nvPr>
+        </p:nvPicPr>
+        <p:blipFill>
+          <a:blip r:embed="rId2"/>
+          <a:stretch>
+            <a:fillRect/>
+          </a:stretch>
+        </p:blipFill>
+        <p:spPr>
+          <a:xfrm>
+            <a:off x="547257" y="2056092"/>
+            <a:ext cx="4929601" cy="3880022"/>
+          </a:xfrm>
+          <a:prstGeom prst="rect">
+            <a:avLst/>
+          </a:prstGeom>
+        </p:spPr>
+      </p:pic>
+      <p:sp>
+        <p:nvSpPr>
+          <p:cNvPr id="4" name="Segnaposto contenuto 3"/>
+          <p:cNvSpPr>
+            <a:spLocks noGrp="1"/>
+          </p:cNvSpPr>
+          <p:nvPr>
+            <p:ph sz="half" idx="2"/>
+          </p:nvPr>
+        </p:nvSpPr>
+        <p:spPr/>
+        <p:txBody>
+          <a:bodyPr/>
+          <a:lstStyle/>
+          <a:p>
+            <a:r>
+              <a:rPr lang="it-IT" dirty="0" smtClean="0"/>
+              <a:t>La finestra login permette di verificare la validità dell’utente che prova ad accedere all’area riservata</a:t>
+            </a:r>
+          </a:p>
+          <a:p>
+            <a:r>
+              <a:rPr lang="it-IT" dirty="0" smtClean="0"/>
+              <a:t>Se le credenziali sono corrette l’utente potrà accedere alla sua area riservata</a:t>
+            </a:r>
+            <a:endParaRPr lang="it-IT" dirty="0"/>
+          </a:p>
+        </p:txBody>
+      </p:sp>
+    </p:spTree>
+    <p:extLst>
+      <p:ext uri="{BB962C8B-B14F-4D97-AF65-F5344CB8AC3E}">
+        <p14:creationId xmlns:p14="http://schemas.microsoft.com/office/powerpoint/2010/main" val="951525063"/>
+      </p:ext>
+    </p:extLst>
+  </p:cSld>
+  <p:clrMapOvr>
+    <a:masterClrMapping/>
+  </p:clrMapOvr>
+</p:sld>
+</file>
+
+<file path=ppt/slides/slide9.xml><?xml version="1.0" encoding="utf-8"?>
+<p:sld xmlns:a="http://schemas.openxmlformats.org/drawingml/2006/main" xmlns:r="http://schemas.openxmlformats.org/officeDocument/2006/relationships" xmlns:p="http://schemas.openxmlformats.org/presentationml/2006/main">
+  <p:cSld>
+    <p:spTree>
+      <p:nvGrpSpPr>
+        <p:cNvPr id="1" name=""/>
+        <p:cNvGrpSpPr/>
+        <p:nvPr/>
+      </p:nvGrpSpPr>
+      <p:grpSpPr>
+        <a:xfrm>
+          <a:off x="0" y="0"/>
+          <a:ext cx="0" cy="0"/>
+          <a:chOff x="0" y="0"/>
+          <a:chExt cx="0" cy="0"/>
+        </a:xfrm>
+      </p:grpSpPr>
+      <p:sp>
+        <p:nvSpPr>
+          <p:cNvPr id="2" name="Titolo 1"/>
+          <p:cNvSpPr>
+            <a:spLocks noGrp="1"/>
+          </p:cNvSpPr>
+          <p:nvPr>
+            <p:ph type="title"/>
+          </p:nvPr>
+        </p:nvSpPr>
+        <p:spPr/>
+        <p:txBody>
+          <a:bodyPr/>
+          <a:lstStyle/>
+          <a:p>
+            <a:r>
+              <a:rPr lang="it-IT" sz="4400" b="1" dirty="0"/>
+              <a:t>Funzionalità e finestre</a:t>
+            </a:r>
+            <a:endParaRPr lang="it-IT" dirty="0"/>
+          </a:p>
+        </p:txBody>
+      </p:sp>
+      <p:pic>
+        <p:nvPicPr>
+          <p:cNvPr id="5" name="Segnaposto contenuto 4"/>
+          <p:cNvPicPr>
+            <a:picLocks noGrp="1" noChangeAspect="1"/>
+          </p:cNvPicPr>
+          <p:nvPr>
+            <p:ph sz="half" idx="1"/>
+          </p:nvPr>
+        </p:nvPicPr>
+        <p:blipFill>
+          <a:blip r:embed="rId2"/>
+          <a:stretch>
+            <a:fillRect/>
+          </a:stretch>
+        </p:blipFill>
+        <p:spPr>
+          <a:xfrm>
+            <a:off x="156913" y="1977081"/>
+            <a:ext cx="5342188" cy="3429779"/>
+          </a:xfrm>
+          <a:prstGeom prst="rect">
+            <a:avLst/>
+          </a:prstGeom>
+        </p:spPr>
+      </p:pic>
+      <p:sp>
+        <p:nvSpPr>
+          <p:cNvPr id="4" name="Segnaposto contenuto 3"/>
+          <p:cNvSpPr>
+            <a:spLocks noGrp="1"/>
+          </p:cNvSpPr>
+          <p:nvPr>
+            <p:ph sz="half" idx="2"/>
+          </p:nvPr>
+        </p:nvSpPr>
+        <p:spPr/>
+        <p:txBody>
+          <a:bodyPr/>
+          <a:lstStyle/>
+          <a:p>
+            <a:r>
+              <a:rPr lang="it-IT" dirty="0" smtClean="0"/>
+              <a:t>Nella finestra Area Riservata l’utente potrà:</a:t>
+            </a:r>
+          </a:p>
+          <a:p>
+            <a:r>
+              <a:rPr lang="it-IT" dirty="0" smtClean="0"/>
+              <a:t>Visualizzare il biglietto corrente</a:t>
+            </a:r>
+          </a:p>
+          <a:p>
+            <a:r>
+              <a:rPr lang="it-IT" dirty="0" smtClean="0"/>
+              <a:t>Acquistare un biglietto o abbonamento</a:t>
+            </a:r>
+          </a:p>
+          <a:p>
+            <a:r>
+              <a:rPr lang="it-IT" dirty="0" smtClean="0"/>
+              <a:t>Visualizzare il </a:t>
+            </a:r>
+            <a:r>
+              <a:rPr lang="it-IT" smtClean="0"/>
+              <a:t>saldo corrente</a:t>
+            </a:r>
+            <a:endParaRPr lang="it-IT" dirty="0" smtClean="0"/>
+          </a:p>
+        </p:txBody>
+      </p:sp>
+    </p:spTree>
+    <p:extLst>
+      <p:ext uri="{BB962C8B-B14F-4D97-AF65-F5344CB8AC3E}">
+        <p14:creationId xmlns:p14="http://schemas.microsoft.com/office/powerpoint/2010/main" val="3033283070"/>
+      </p:ext>
+    </p:extLst>
+  </p:cSld>
+  <p:clrMapOvr>
+    <a:masterClrMapping/>
+  </p:clrMapOvr>
 </p:sld>
 </file>
 

</xml_diff>